<commit_message>
Validation record form updated with comments
</commit_message>
<xml_diff>
--- a/other docs/RDICE_loop.pptx
+++ b/other docs/RDICE_loop.pptx
@@ -104,7 +104,20 @@
       </a:defRPr>
     </a:lvl9pPr>
   </p:defaultTextStyle>
+  <p:extLst>
+    <p:ext uri="{EFAFB233-063F-42B5-8137-9DF3F51BA10A}">
+      <p15:sldGuideLst xmlns:p15="http://schemas.microsoft.com/office/powerpoint/2012/main"/>
+    </p:ext>
+  </p:extLst>
 </p:presentation>
+</file>
+
+<file path=ppt/revisionInfo.xml><?xml version="1.0" encoding="utf-8"?>
+<p1510:revInfo xmlns:a="http://schemas.openxmlformats.org/drawingml/2006/main" xmlns:r="http://schemas.openxmlformats.org/officeDocument/2006/relationships" xmlns:p1510="http://schemas.microsoft.com/office/powerpoint/2015/10/main">
+  <p1510:revLst>
+    <p1510:client id="{73BC32D7-E0CF-4DB6-8CB5-E509CF5FBE02}" v="2" dt="2024-04-30T10:38:20.390"/>
+  </p1510:revLst>
+</p1510:revInfo>
 </file>
 
 <file path=ppt/changesInfos/changesInfo1.xml><?xml version="1.0" encoding="utf-8"?>
@@ -124,6 +137,30 @@
         </pc:sldMkLst>
         <pc:spChg chg="mod">
           <ac:chgData name="Javier Sanchez Alvarez" userId="cd8f4763-ef1f-4fa2-b3c6-9eb6385c0c14" providerId="ADAL" clId="{2FA9554B-FDAB-4A29-8811-4D24F36C2A7E}" dt="2024-03-25T16:34:51.046" v="445" actId="20577"/>
+          <ac:spMkLst>
+            <pc:docMk/>
+            <pc:sldMk cId="4109918226" sldId="257"/>
+            <ac:spMk id="3" creationId="{24061D9A-D4B1-C44D-1849-4D9354CEB9D5}"/>
+          </ac:spMkLst>
+        </pc:spChg>
+      </pc:sldChg>
+    </pc:docChg>
+  </pc:docChgLst>
+  <pc:docChgLst>
+    <pc:chgData name="Javier Sanchez Alvarez" userId="cd8f4763-ef1f-4fa2-b3c6-9eb6385c0c14" providerId="ADAL" clId="{73BC32D7-E0CF-4DB6-8CB5-E509CF5FBE02}"/>
+    <pc:docChg chg="undo custSel modSld">
+      <pc:chgData name="Javier Sanchez Alvarez" userId="cd8f4763-ef1f-4fa2-b3c6-9eb6385c0c14" providerId="ADAL" clId="{73BC32D7-E0CF-4DB6-8CB5-E509CF5FBE02}" dt="2024-04-30T10:39:58.508" v="261" actId="20577"/>
+      <pc:docMkLst>
+        <pc:docMk/>
+      </pc:docMkLst>
+      <pc:sldChg chg="modSp mod">
+        <pc:chgData name="Javier Sanchez Alvarez" userId="cd8f4763-ef1f-4fa2-b3c6-9eb6385c0c14" providerId="ADAL" clId="{73BC32D7-E0CF-4DB6-8CB5-E509CF5FBE02}" dt="2024-04-30T10:39:58.508" v="261" actId="20577"/>
+        <pc:sldMkLst>
+          <pc:docMk/>
+          <pc:sldMk cId="4109918226" sldId="257"/>
+        </pc:sldMkLst>
+        <pc:spChg chg="mod">
+          <ac:chgData name="Javier Sanchez Alvarez" userId="cd8f4763-ef1f-4fa2-b3c6-9eb6385c0c14" providerId="ADAL" clId="{73BC32D7-E0CF-4DB6-8CB5-E509CF5FBE02}" dt="2024-04-30T10:39:58.508" v="261" actId="20577"/>
           <ac:spMkLst>
             <pc:docMk/>
             <pc:sldMk cId="4109918226" sldId="257"/>
@@ -283,7 +320,7 @@
           <a:p>
             <a:fld id="{72B64A56-A9CE-430E-A4AE-E3438CBC3BA5}" type="datetimeFigureOut">
               <a:rPr lang="en-US" smtClean="0"/>
-              <a:t>3/25/2024</a:t>
+              <a:t>4/30/2024</a:t>
             </a:fld>
             <a:endParaRPr lang="en-US"/>
           </a:p>
@@ -481,7 +518,7 @@
           <a:p>
             <a:fld id="{72B64A56-A9CE-430E-A4AE-E3438CBC3BA5}" type="datetimeFigureOut">
               <a:rPr lang="en-US" smtClean="0"/>
-              <a:t>3/25/2024</a:t>
+              <a:t>4/30/2024</a:t>
             </a:fld>
             <a:endParaRPr lang="en-US"/>
           </a:p>
@@ -689,7 +726,7 @@
           <a:p>
             <a:fld id="{72B64A56-A9CE-430E-A4AE-E3438CBC3BA5}" type="datetimeFigureOut">
               <a:rPr lang="en-US" smtClean="0"/>
-              <a:t>3/25/2024</a:t>
+              <a:t>4/30/2024</a:t>
             </a:fld>
             <a:endParaRPr lang="en-US"/>
           </a:p>
@@ -887,7 +924,7 @@
           <a:p>
             <a:fld id="{72B64A56-A9CE-430E-A4AE-E3438CBC3BA5}" type="datetimeFigureOut">
               <a:rPr lang="en-US" smtClean="0"/>
-              <a:t>3/25/2024</a:t>
+              <a:t>4/30/2024</a:t>
             </a:fld>
             <a:endParaRPr lang="en-US"/>
           </a:p>
@@ -1162,7 +1199,7 @@
           <a:p>
             <a:fld id="{72B64A56-A9CE-430E-A4AE-E3438CBC3BA5}" type="datetimeFigureOut">
               <a:rPr lang="en-US" smtClean="0"/>
-              <a:t>3/25/2024</a:t>
+              <a:t>4/30/2024</a:t>
             </a:fld>
             <a:endParaRPr lang="en-US"/>
           </a:p>
@@ -1427,7 +1464,7 @@
           <a:p>
             <a:fld id="{72B64A56-A9CE-430E-A4AE-E3438CBC3BA5}" type="datetimeFigureOut">
               <a:rPr lang="en-US" smtClean="0"/>
-              <a:t>3/25/2024</a:t>
+              <a:t>4/30/2024</a:t>
             </a:fld>
             <a:endParaRPr lang="en-US"/>
           </a:p>
@@ -1839,7 +1876,7 @@
           <a:p>
             <a:fld id="{72B64A56-A9CE-430E-A4AE-E3438CBC3BA5}" type="datetimeFigureOut">
               <a:rPr lang="en-US" smtClean="0"/>
-              <a:t>3/25/2024</a:t>
+              <a:t>4/30/2024</a:t>
             </a:fld>
             <a:endParaRPr lang="en-US"/>
           </a:p>
@@ -1980,7 +2017,7 @@
           <a:p>
             <a:fld id="{72B64A56-A9CE-430E-A4AE-E3438CBC3BA5}" type="datetimeFigureOut">
               <a:rPr lang="en-US" smtClean="0"/>
-              <a:t>3/25/2024</a:t>
+              <a:t>4/30/2024</a:t>
             </a:fld>
             <a:endParaRPr lang="en-US"/>
           </a:p>
@@ -2093,7 +2130,7 @@
           <a:p>
             <a:fld id="{72B64A56-A9CE-430E-A4AE-E3438CBC3BA5}" type="datetimeFigureOut">
               <a:rPr lang="en-US" smtClean="0"/>
-              <a:t>3/25/2024</a:t>
+              <a:t>4/30/2024</a:t>
             </a:fld>
             <a:endParaRPr lang="en-US"/>
           </a:p>
@@ -2404,7 +2441,7 @@
           <a:p>
             <a:fld id="{72B64A56-A9CE-430E-A4AE-E3438CBC3BA5}" type="datetimeFigureOut">
               <a:rPr lang="en-US" smtClean="0"/>
-              <a:t>3/25/2024</a:t>
+              <a:t>4/30/2024</a:t>
             </a:fld>
             <a:endParaRPr lang="en-US"/>
           </a:p>
@@ -2692,7 +2729,7 @@
           <a:p>
             <a:fld id="{72B64A56-A9CE-430E-A4AE-E3438CBC3BA5}" type="datetimeFigureOut">
               <a:rPr lang="en-US" smtClean="0"/>
-              <a:t>3/25/2024</a:t>
+              <a:t>4/30/2024</a:t>
             </a:fld>
             <a:endParaRPr lang="en-US"/>
           </a:p>
@@ -2933,7 +2970,7 @@
           <a:p>
             <a:fld id="{72B64A56-A9CE-430E-A4AE-E3438CBC3BA5}" type="datetimeFigureOut">
               <a:rPr lang="en-US" smtClean="0"/>
-              <a:t>3/25/2024</a:t>
+              <a:t>4/30/2024</a:t>
             </a:fld>
             <a:endParaRPr lang="en-US"/>
           </a:p>
@@ -3368,8 +3405,8 @@
         </p:nvSpPr>
         <p:spPr>
           <a:xfrm>
-            <a:off x="838200" y="310551"/>
-            <a:ext cx="10515600" cy="6280030"/>
+            <a:off x="838199" y="310551"/>
+            <a:ext cx="11031747" cy="6280030"/>
           </a:xfrm>
         </p:spPr>
         <p:txBody>
@@ -3382,7 +3419,7 @@
               <a:buNone/>
             </a:pPr>
             <a:r>
-              <a:rPr lang="en-US" sz="1400" b="1" u="sng" dirty="0"/>
+              <a:rPr lang="en-US" sz="1200" b="1" u="sng" dirty="0"/>
               <a:t>R DICE LOOP</a:t>
             </a:r>
           </a:p>
@@ -3391,7 +3428,7 @@
               <a:buNone/>
             </a:pPr>
             <a:r>
-              <a:rPr lang="en-US" sz="1400" b="1" dirty="0"/>
+              <a:rPr lang="en-US" sz="1200" b="1" dirty="0"/>
               <a:t>I - Declare global objects</a:t>
             </a:r>
           </a:p>
@@ -3400,21 +3437,21 @@
               <a:buNone/>
             </a:pPr>
             <a:r>
-              <a:rPr lang="en-US" sz="1400" b="1" dirty="0"/>
+              <a:rPr lang="en-US" sz="1200" b="1" dirty="0"/>
               <a:t>II - Call functions to declare which inputs are loaded when, events, </a:t>
             </a:r>
             <a:r>
-              <a:rPr lang="en-US" sz="1400" b="1" dirty="0" err="1"/>
+              <a:rPr lang="en-US" sz="1200" b="1" dirty="0" err="1"/>
               <a:t>etc</a:t>
             </a:r>
-            <a:endParaRPr lang="en-US" sz="1400" b="1" dirty="0"/>
+            <a:endParaRPr lang="en-US" sz="1200" b="1" dirty="0"/>
           </a:p>
           <a:p>
             <a:pPr marL="0" indent="0">
               <a:buNone/>
             </a:pPr>
             <a:r>
-              <a:rPr lang="en-US" sz="1400" b="1" dirty="0"/>
+              <a:rPr lang="en-US" sz="1200" b="1" dirty="0"/>
               <a:t>III - Run main DICE engine loop:</a:t>
             </a:r>
           </a:p>
@@ -3423,19 +3460,19 @@
               <a:buNone/>
             </a:pPr>
             <a:r>
-              <a:rPr lang="en-US" sz="1400" b="1" dirty="0"/>
+              <a:rPr lang="en-US" sz="1200" b="1" dirty="0"/>
               <a:t>1- For analysis in </a:t>
             </a:r>
             <a:r>
-              <a:rPr lang="en-US" sz="1400" b="1" dirty="0" err="1"/>
+              <a:rPr lang="en-US" sz="1200" b="1" dirty="0" err="1"/>
               <a:t>n_analysis</a:t>
             </a:r>
             <a:r>
-              <a:rPr lang="en-US" sz="1400" b="1" dirty="0"/>
+              <a:rPr lang="en-US" sz="1200" b="1" dirty="0"/>
               <a:t> </a:t>
             </a:r>
             <a:r>
-              <a:rPr lang="en-US" sz="1400" dirty="0"/>
+              <a:rPr lang="en-US" sz="1200" dirty="0"/>
               <a:t>(e.g., DSA)</a:t>
             </a:r>
           </a:p>
@@ -3444,7 +3481,7 @@
               <a:buNone/>
             </a:pPr>
             <a:r>
-              <a:rPr lang="en-US" sz="1400" dirty="0">
+              <a:rPr lang="en-US" sz="1200" dirty="0">
                 <a:solidFill>
                   <a:schemeClr val="accent6"/>
                 </a:solidFill>
@@ -3457,29 +3494,29 @@
               <a:buNone/>
             </a:pPr>
             <a:r>
-              <a:rPr lang="en-US" sz="1400" b="1" dirty="0"/>
+              <a:rPr lang="en-US" sz="1200" b="1" dirty="0"/>
               <a:t>	2- For replication in </a:t>
             </a:r>
             <a:r>
-              <a:rPr lang="en-US" sz="1400" b="1" dirty="0" err="1"/>
+              <a:rPr lang="en-US" sz="1200" b="1" dirty="0" err="1"/>
               <a:t>n_replication</a:t>
             </a:r>
             <a:r>
-              <a:rPr lang="en-US" sz="1400" b="1" dirty="0"/>
+              <a:rPr lang="en-US" sz="1200" b="1" dirty="0"/>
               <a:t> </a:t>
             </a:r>
             <a:r>
-              <a:rPr lang="en-US" sz="1400" dirty="0"/>
+              <a:rPr lang="en-US" sz="1200" dirty="0"/>
               <a:t>(e.g., PSA)</a:t>
             </a:r>
-            <a:endParaRPr lang="en-US" sz="1400" b="1" dirty="0"/>
+            <a:endParaRPr lang="en-US" sz="1200" b="1" dirty="0"/>
           </a:p>
           <a:p>
             <a:pPr marL="0" indent="0">
               <a:buNone/>
             </a:pPr>
             <a:r>
-              <a:rPr lang="en-US" sz="1400" dirty="0">
+              <a:rPr lang="en-US" sz="1200" dirty="0">
                 <a:solidFill>
                   <a:schemeClr val="accent6"/>
                 </a:solidFill>
@@ -3492,21 +3529,21 @@
               <a:buNone/>
             </a:pPr>
             <a:r>
-              <a:rPr lang="en-US" sz="1400" b="1" dirty="0"/>
+              <a:rPr lang="en-US" sz="1200" b="1" dirty="0"/>
               <a:t>		3- For patient in </a:t>
             </a:r>
             <a:r>
-              <a:rPr lang="en-US" sz="1400" b="1" dirty="0" err="1"/>
+              <a:rPr lang="en-US" sz="1200" b="1" dirty="0" err="1"/>
               <a:t>n_patients</a:t>
             </a:r>
-            <a:endParaRPr lang="en-US" sz="1400" b="1" dirty="0"/>
+            <a:endParaRPr lang="en-US" sz="1200" b="1" dirty="0"/>
           </a:p>
           <a:p>
             <a:pPr marL="0" indent="0">
               <a:buNone/>
             </a:pPr>
             <a:r>
-              <a:rPr lang="en-US" sz="1400" dirty="0">
+              <a:rPr lang="en-US" sz="1200" dirty="0">
                 <a:solidFill>
                   <a:schemeClr val="accent6"/>
                 </a:solidFill>
@@ -3519,21 +3556,21 @@
               <a:buNone/>
             </a:pPr>
             <a:r>
-              <a:rPr lang="en-US" sz="1400" b="1" dirty="0"/>
+              <a:rPr lang="en-US" sz="1200" b="1" dirty="0"/>
               <a:t>			4- For intervention in </a:t>
             </a:r>
             <a:r>
-              <a:rPr lang="en-US" sz="1400" b="1" dirty="0" err="1"/>
+              <a:rPr lang="en-US" sz="1200" b="1" dirty="0" err="1"/>
               <a:t>n_intervention</a:t>
             </a:r>
-            <a:endParaRPr lang="en-US" sz="1400" b="1" dirty="0"/>
+            <a:endParaRPr lang="en-US" sz="1200" b="1" dirty="0"/>
           </a:p>
           <a:p>
             <a:pPr marL="0" indent="0">
               <a:buNone/>
             </a:pPr>
             <a:r>
-              <a:rPr lang="en-US" sz="1400" dirty="0">
+              <a:rPr lang="en-US" sz="1200" dirty="0">
                 <a:solidFill>
                   <a:schemeClr val="accent6"/>
                 </a:solidFill>
@@ -3546,7 +3583,7 @@
               <a:buNone/>
             </a:pPr>
             <a:r>
-              <a:rPr lang="en-US" sz="1400" dirty="0"/>
+              <a:rPr lang="en-US" sz="1200" dirty="0"/>
               <a:t>				Set time = 0</a:t>
             </a:r>
           </a:p>
@@ -3555,7 +3592,7 @@
               <a:buNone/>
             </a:pPr>
             <a:r>
-              <a:rPr lang="en-US" sz="1400" dirty="0"/>
+              <a:rPr lang="en-US" sz="1200" dirty="0"/>
               <a:t>				Initialize event times (by default set to Infinity)</a:t>
             </a:r>
           </a:p>
@@ -3564,15 +3601,15 @@
               <a:buNone/>
             </a:pPr>
             <a:r>
-              <a:rPr lang="en-US" sz="1400" b="1" dirty="0"/>
+              <a:rPr lang="en-US" sz="1200" b="1" dirty="0"/>
               <a:t>				5- For event in </a:t>
             </a:r>
             <a:r>
-              <a:rPr lang="en-US" sz="1400" b="1" dirty="0" err="1"/>
+              <a:rPr lang="en-US" sz="1200" b="1" dirty="0" err="1"/>
               <a:t>list_events</a:t>
             </a:r>
             <a:r>
-              <a:rPr lang="en-US" sz="1400" b="1" dirty="0"/>
+              <a:rPr lang="en-US" sz="1200" b="1" dirty="0"/>
               <a:t> (sorted by time)</a:t>
             </a:r>
           </a:p>
@@ -3581,12 +3618,12 @@
               <a:buNone/>
             </a:pPr>
             <a:r>
-              <a:rPr lang="en-US" sz="1400" dirty="0">
+              <a:rPr lang="en-US" sz="1200" dirty="0">
                 <a:solidFill>
                   <a:schemeClr val="accent6"/>
                 </a:solidFill>
               </a:rPr>
-              <a:t>					Evaluate costs/utilities formulas</a:t>
+              <a:t>					Reset instantaneous items back to 0</a:t>
             </a:r>
           </a:p>
           <a:p>
@@ -3594,7 +3631,7 @@
               <a:buNone/>
             </a:pPr>
             <a:r>
-              <a:rPr lang="en-US" sz="1400" dirty="0"/>
+              <a:rPr lang="en-US" sz="1200" dirty="0"/>
               <a:t>					Execute reaction to event </a:t>
             </a:r>
           </a:p>
@@ -3603,7 +3640,7 @@
               <a:buNone/>
             </a:pPr>
             <a:r>
-              <a:rPr lang="en-US" sz="1400" dirty="0">
+              <a:rPr lang="en-US" sz="1200" dirty="0">
                 <a:solidFill>
                   <a:schemeClr val="accent6"/>
                 </a:solidFill>
@@ -3616,7 +3653,20 @@
               <a:buNone/>
             </a:pPr>
             <a:r>
-              <a:rPr lang="en-US" sz="1400" dirty="0">
+              <a:rPr lang="en-US" sz="1200" dirty="0">
+                <a:solidFill>
+                  <a:schemeClr val="accent6"/>
+                </a:solidFill>
+              </a:rPr>
+              <a:t>							If ongoing variable, add a flag which determines that it was called here</a:t>
+            </a:r>
+          </a:p>
+          <a:p>
+            <a:pPr marL="0" indent="0">
+              <a:buNone/>
+            </a:pPr>
+            <a:r>
+              <a:rPr lang="en-US" sz="1200" dirty="0">
                 <a:solidFill>
                   <a:schemeClr val="accent6"/>
                 </a:solidFill>
@@ -3629,7 +3679,7 @@
               <a:buNone/>
             </a:pPr>
             <a:r>
-              <a:rPr lang="en-US" sz="1400" dirty="0"/>
+              <a:rPr lang="en-US" sz="1200" dirty="0"/>
               <a:t>					Stop at time = Infinity</a:t>
             </a:r>
           </a:p>
@@ -3638,16 +3688,24 @@
               <a:buNone/>
             </a:pPr>
             <a:r>
-              <a:rPr lang="en-US" sz="1400" dirty="0"/>
+              <a:rPr lang="en-US" sz="1200" dirty="0"/>
               <a:t>		Compute costs, qalys and </a:t>
             </a:r>
             <a:r>
-              <a:rPr lang="en-US" sz="1400" dirty="0" err="1"/>
+              <a:rPr lang="en-US" sz="1200" dirty="0" err="1"/>
               <a:t>lys</a:t>
             </a:r>
             <a:r>
-              <a:rPr lang="en-US" sz="1400" dirty="0"/>
-              <a:t> (vectorized) [continuously, instant, or per cycle] </a:t>
+              <a:rPr lang="en-US" sz="1200" dirty="0"/>
+              <a:t> (vectorized) [ongoing (if ongoing, it uses the flags declared in </a:t>
+            </a:r>
+            <a:r>
+              <a:rPr lang="en-US" sz="1200" dirty="0" err="1"/>
+              <a:t>modify_inputs</a:t>
+            </a:r>
+            <a:r>
+              <a:rPr lang="en-US" sz="1200" dirty="0"/>
+              <a:t>), instant, or per cycle] </a:t>
             </a:r>
           </a:p>
           <a:p>
@@ -3655,7 +3713,7 @@
               <a:buNone/>
             </a:pPr>
             <a:r>
-              <a:rPr lang="en-US" sz="1400" dirty="0"/>
+              <a:rPr lang="en-US" sz="1200" dirty="0"/>
               <a:t>Return nested list of outcomes (e.g., results[analysis 1][simulation 1])</a:t>
             </a:r>
           </a:p>
@@ -3663,7 +3721,7 @@
             <a:pPr marL="0" indent="0">
               <a:buNone/>
             </a:pPr>
-            <a:endParaRPr lang="en-US" sz="1400" dirty="0"/>
+            <a:endParaRPr lang="en-US" sz="1200" dirty="0"/>
           </a:p>
         </p:txBody>
       </p:sp>

</xml_diff>

<commit_message>
Adjusted vignettes for modern use of functions, updated website and selected documentation
</commit_message>
<xml_diff>
--- a/other docs/RDICE_loop.pptx
+++ b/other docs/RDICE_loop.pptx
@@ -112,14 +112,6 @@
 </p:presentation>
 </file>
 
-<file path=ppt/revisionInfo.xml><?xml version="1.0" encoding="utf-8"?>
-<p1510:revInfo xmlns:a="http://schemas.openxmlformats.org/drawingml/2006/main" xmlns:r="http://schemas.openxmlformats.org/officeDocument/2006/relationships" xmlns:p1510="http://schemas.microsoft.com/office/powerpoint/2015/10/main">
-  <p1510:revLst>
-    <p1510:client id="{73BC32D7-E0CF-4DB6-8CB5-E509CF5FBE02}" v="2" dt="2024-04-30T10:38:20.390"/>
-  </p1510:revLst>
-</p1510:revInfo>
-</file>
-
 <file path=ppt/changesInfos/changesInfo1.xml><?xml version="1.0" encoding="utf-8"?>
 <pc:chgInfo xmlns:a="http://schemas.openxmlformats.org/drawingml/2006/main" xmlns:r="http://schemas.openxmlformats.org/officeDocument/2006/relationships" xmlns:ac="http://schemas.microsoft.com/office/drawing/2013/main/command" xmlns:pc="http://schemas.microsoft.com/office/powerpoint/2013/main/command">
   <pc:docChgLst>
@@ -137,6 +129,30 @@
         </pc:sldMkLst>
         <pc:spChg chg="mod">
           <ac:chgData name="Javier Sanchez Alvarez" userId="cd8f4763-ef1f-4fa2-b3c6-9eb6385c0c14" providerId="ADAL" clId="{2FA9554B-FDAB-4A29-8811-4D24F36C2A7E}" dt="2024-03-25T16:34:51.046" v="445" actId="20577"/>
+          <ac:spMkLst>
+            <pc:docMk/>
+            <pc:sldMk cId="4109918226" sldId="257"/>
+            <ac:spMk id="3" creationId="{24061D9A-D4B1-C44D-1849-4D9354CEB9D5}"/>
+          </ac:spMkLst>
+        </pc:spChg>
+      </pc:sldChg>
+    </pc:docChg>
+  </pc:docChgLst>
+  <pc:docChgLst>
+    <pc:chgData name="Javier Sanchez Alvarez" userId="cd8f4763-ef1f-4fa2-b3c6-9eb6385c0c14" providerId="ADAL" clId="{EE9F1014-062A-43C2-B61B-2348FB5DD800}"/>
+    <pc:docChg chg="undo custSel modSld">
+      <pc:chgData name="Javier Sanchez Alvarez" userId="cd8f4763-ef1f-4fa2-b3c6-9eb6385c0c14" providerId="ADAL" clId="{EE9F1014-062A-43C2-B61B-2348FB5DD800}" dt="2024-10-21T10:44:50.136" v="323" actId="20577"/>
+      <pc:docMkLst>
+        <pc:docMk/>
+      </pc:docMkLst>
+      <pc:sldChg chg="modSp mod">
+        <pc:chgData name="Javier Sanchez Alvarez" userId="cd8f4763-ef1f-4fa2-b3c6-9eb6385c0c14" providerId="ADAL" clId="{EE9F1014-062A-43C2-B61B-2348FB5DD800}" dt="2024-10-21T10:44:50.136" v="323" actId="20577"/>
+        <pc:sldMkLst>
+          <pc:docMk/>
+          <pc:sldMk cId="4109918226" sldId="257"/>
+        </pc:sldMkLst>
+        <pc:spChg chg="mod">
+          <ac:chgData name="Javier Sanchez Alvarez" userId="cd8f4763-ef1f-4fa2-b3c6-9eb6385c0c14" providerId="ADAL" clId="{EE9F1014-062A-43C2-B61B-2348FB5DD800}" dt="2024-10-21T10:44:50.136" v="323" actId="20577"/>
           <ac:spMkLst>
             <pc:docMk/>
             <pc:sldMk cId="4109918226" sldId="257"/>
@@ -320,7 +336,7 @@
           <a:p>
             <a:fld id="{72B64A56-A9CE-430E-A4AE-E3438CBC3BA5}" type="datetimeFigureOut">
               <a:rPr lang="en-US" smtClean="0"/>
-              <a:t>4/30/2024</a:t>
+              <a:t>10/21/2024</a:t>
             </a:fld>
             <a:endParaRPr lang="en-US"/>
           </a:p>
@@ -518,7 +534,7 @@
           <a:p>
             <a:fld id="{72B64A56-A9CE-430E-A4AE-E3438CBC3BA5}" type="datetimeFigureOut">
               <a:rPr lang="en-US" smtClean="0"/>
-              <a:t>4/30/2024</a:t>
+              <a:t>10/21/2024</a:t>
             </a:fld>
             <a:endParaRPr lang="en-US"/>
           </a:p>
@@ -726,7 +742,7 @@
           <a:p>
             <a:fld id="{72B64A56-A9CE-430E-A4AE-E3438CBC3BA5}" type="datetimeFigureOut">
               <a:rPr lang="en-US" smtClean="0"/>
-              <a:t>4/30/2024</a:t>
+              <a:t>10/21/2024</a:t>
             </a:fld>
             <a:endParaRPr lang="en-US"/>
           </a:p>
@@ -924,7 +940,7 @@
           <a:p>
             <a:fld id="{72B64A56-A9CE-430E-A4AE-E3438CBC3BA5}" type="datetimeFigureOut">
               <a:rPr lang="en-US" smtClean="0"/>
-              <a:t>4/30/2024</a:t>
+              <a:t>10/21/2024</a:t>
             </a:fld>
             <a:endParaRPr lang="en-US"/>
           </a:p>
@@ -1199,7 +1215,7 @@
           <a:p>
             <a:fld id="{72B64A56-A9CE-430E-A4AE-E3438CBC3BA5}" type="datetimeFigureOut">
               <a:rPr lang="en-US" smtClean="0"/>
-              <a:t>4/30/2024</a:t>
+              <a:t>10/21/2024</a:t>
             </a:fld>
             <a:endParaRPr lang="en-US"/>
           </a:p>
@@ -1464,7 +1480,7 @@
           <a:p>
             <a:fld id="{72B64A56-A9CE-430E-A4AE-E3438CBC3BA5}" type="datetimeFigureOut">
               <a:rPr lang="en-US" smtClean="0"/>
-              <a:t>4/30/2024</a:t>
+              <a:t>10/21/2024</a:t>
             </a:fld>
             <a:endParaRPr lang="en-US"/>
           </a:p>
@@ -1876,7 +1892,7 @@
           <a:p>
             <a:fld id="{72B64A56-A9CE-430E-A4AE-E3438CBC3BA5}" type="datetimeFigureOut">
               <a:rPr lang="en-US" smtClean="0"/>
-              <a:t>4/30/2024</a:t>
+              <a:t>10/21/2024</a:t>
             </a:fld>
             <a:endParaRPr lang="en-US"/>
           </a:p>
@@ -2017,7 +2033,7 @@
           <a:p>
             <a:fld id="{72B64A56-A9CE-430E-A4AE-E3438CBC3BA5}" type="datetimeFigureOut">
               <a:rPr lang="en-US" smtClean="0"/>
-              <a:t>4/30/2024</a:t>
+              <a:t>10/21/2024</a:t>
             </a:fld>
             <a:endParaRPr lang="en-US"/>
           </a:p>
@@ -2130,7 +2146,7 @@
           <a:p>
             <a:fld id="{72B64A56-A9CE-430E-A4AE-E3438CBC3BA5}" type="datetimeFigureOut">
               <a:rPr lang="en-US" smtClean="0"/>
-              <a:t>4/30/2024</a:t>
+              <a:t>10/21/2024</a:t>
             </a:fld>
             <a:endParaRPr lang="en-US"/>
           </a:p>
@@ -2441,7 +2457,7 @@
           <a:p>
             <a:fld id="{72B64A56-A9CE-430E-A4AE-E3438CBC3BA5}" type="datetimeFigureOut">
               <a:rPr lang="en-US" smtClean="0"/>
-              <a:t>4/30/2024</a:t>
+              <a:t>10/21/2024</a:t>
             </a:fld>
             <a:endParaRPr lang="en-US"/>
           </a:p>
@@ -2729,7 +2745,7 @@
           <a:p>
             <a:fld id="{72B64A56-A9CE-430E-A4AE-E3438CBC3BA5}" type="datetimeFigureOut">
               <a:rPr lang="en-US" smtClean="0"/>
-              <a:t>4/30/2024</a:t>
+              <a:t>10/21/2024</a:t>
             </a:fld>
             <a:endParaRPr lang="en-US"/>
           </a:p>
@@ -2970,7 +2986,7 @@
           <a:p>
             <a:fld id="{72B64A56-A9CE-430E-A4AE-E3438CBC3BA5}" type="datetimeFigureOut">
               <a:rPr lang="en-US" smtClean="0"/>
-              <a:t>4/30/2024</a:t>
+              <a:t>10/21/2024</a:t>
             </a:fld>
             <a:endParaRPr lang="en-US"/>
           </a:p>
@@ -3438,7 +3454,7 @@
             </a:pPr>
             <a:r>
               <a:rPr lang="en-US" sz="1200" b="1" dirty="0"/>
-              <a:t>II - Call functions to declare which inputs are loaded when, events, </a:t>
+              <a:t>II - Call functions to declare which inputs are loaded when, events, replicate patients, </a:t>
             </a:r>
             <a:r>
               <a:rPr lang="en-US" sz="1200" b="1" dirty="0" err="1"/>
@@ -3465,7 +3481,7 @@
             </a:r>
             <a:r>
               <a:rPr lang="en-US" sz="1200" b="1" dirty="0" err="1"/>
-              <a:t>n_analysis</a:t>
+              <a:t>n_sensitivity</a:t>
             </a:r>
             <a:r>
               <a:rPr lang="en-US" sz="1200" b="1" dirty="0"/>
@@ -3474,6 +3490,178 @@
             <a:r>
               <a:rPr lang="en-US" sz="1200" dirty="0"/>
               <a:t>(e.g., DSA)</a:t>
+            </a:r>
+          </a:p>
+          <a:p>
+            <a:pPr marL="0" indent="0">
+              <a:buNone/>
+            </a:pPr>
+            <a:r>
+              <a:rPr lang="en-US" sz="1200" dirty="0">
+                <a:solidFill>
+                  <a:schemeClr val="accent6">
+                    <a:lumMod val="75000"/>
+                  </a:schemeClr>
+                </a:solidFill>
+              </a:rPr>
+              <a:t>	Load Sensitivity level inputs (constants, structural statics)</a:t>
+            </a:r>
+          </a:p>
+          <a:p>
+            <a:pPr marL="0" indent="0">
+              <a:buNone/>
+            </a:pPr>
+            <a:r>
+              <a:rPr lang="en-US" sz="1200" b="1" dirty="0"/>
+              <a:t>	2- For replication in </a:t>
+            </a:r>
+            <a:r>
+              <a:rPr lang="en-US" sz="1200" b="1" dirty="0" err="1"/>
+              <a:t>n_simulation</a:t>
+            </a:r>
+            <a:r>
+              <a:rPr lang="en-US" sz="1200" b="1" dirty="0"/>
+              <a:t> </a:t>
+            </a:r>
+            <a:r>
+              <a:rPr lang="en-US" sz="1200" dirty="0"/>
+              <a:t>(e.g., PSA)</a:t>
+            </a:r>
+            <a:endParaRPr lang="en-US" sz="1200" b="1" dirty="0"/>
+          </a:p>
+          <a:p>
+            <a:pPr marL="0" indent="0">
+              <a:buNone/>
+            </a:pPr>
+            <a:r>
+              <a:rPr lang="en-US" sz="1200" dirty="0">
+                <a:solidFill>
+                  <a:schemeClr val="accent6">
+                    <a:lumMod val="75000"/>
+                  </a:schemeClr>
+                </a:solidFill>
+              </a:rPr>
+              <a:t>		Load Simulation level inputs (other statics)</a:t>
+            </a:r>
+          </a:p>
+          <a:p>
+            <a:pPr marL="0" indent="0">
+              <a:buNone/>
+            </a:pPr>
+            <a:r>
+              <a:rPr lang="en-US" sz="1200" b="1" dirty="0"/>
+              <a:t>		3- For patient in </a:t>
+            </a:r>
+            <a:r>
+              <a:rPr lang="en-US" sz="1200" b="1" dirty="0" err="1"/>
+              <a:t>n_patients</a:t>
+            </a:r>
+            <a:r>
+              <a:rPr lang="en-US" sz="1200" b="1" dirty="0"/>
+              <a:t> (Note: R DICE does the replication outside this loop)</a:t>
+            </a:r>
+          </a:p>
+          <a:p>
+            <a:pPr marL="0" indent="0">
+              <a:buNone/>
+            </a:pPr>
+            <a:r>
+              <a:rPr lang="en-US" sz="1200" dirty="0">
+                <a:solidFill>
+                  <a:schemeClr val="accent6">
+                    <a:lumMod val="75000"/>
+                  </a:schemeClr>
+                </a:solidFill>
+              </a:rPr>
+              <a:t>			Load Patient level inputs (profiles)</a:t>
+            </a:r>
+          </a:p>
+          <a:p>
+            <a:pPr marL="0" indent="0">
+              <a:buNone/>
+            </a:pPr>
+            <a:r>
+              <a:rPr lang="en-US" sz="1200" b="1" dirty="0"/>
+              <a:t>			4- For intervention in </a:t>
+            </a:r>
+            <a:r>
+              <a:rPr lang="en-US" sz="1200" b="1" dirty="0" err="1"/>
+              <a:t>n_intervention</a:t>
+            </a:r>
+            <a:endParaRPr lang="en-US" sz="1200" b="1" dirty="0"/>
+          </a:p>
+          <a:p>
+            <a:pPr marL="0" indent="0">
+              <a:buNone/>
+            </a:pPr>
+            <a:r>
+              <a:rPr lang="en-US" sz="1200" dirty="0">
+                <a:solidFill>
+                  <a:schemeClr val="accent6">
+                    <a:lumMod val="75000"/>
+                  </a:schemeClr>
+                </a:solidFill>
+              </a:rPr>
+              <a:t>				Load Intervention level inputs (Intervention Data, dynamic conditions)</a:t>
+            </a:r>
+          </a:p>
+          <a:p>
+            <a:pPr marL="0" indent="0">
+              <a:buNone/>
+            </a:pPr>
+            <a:r>
+              <a:rPr lang="en-US" sz="1200" dirty="0"/>
+              <a:t>				Set time = 0</a:t>
+            </a:r>
+          </a:p>
+          <a:p>
+            <a:pPr marL="0" indent="0">
+              <a:buNone/>
+            </a:pPr>
+            <a:r>
+              <a:rPr lang="en-US" sz="1200" dirty="0"/>
+              <a:t>				Initialize event times (by default set to Infinity)</a:t>
+            </a:r>
+          </a:p>
+          <a:p>
+            <a:pPr marL="0" indent="0">
+              <a:buNone/>
+            </a:pPr>
+            <a:r>
+              <a:rPr lang="en-US" sz="1200" b="1" dirty="0"/>
+              <a:t>				5- For event in </a:t>
+            </a:r>
+            <a:r>
+              <a:rPr lang="en-US" sz="1200" b="1" dirty="0" err="1"/>
+              <a:t>list_events</a:t>
+            </a:r>
+            <a:r>
+              <a:rPr lang="en-US" sz="1200" b="1" dirty="0"/>
+              <a:t> (sorted by time)</a:t>
+            </a:r>
+          </a:p>
+          <a:p>
+            <a:pPr marL="0" indent="0">
+              <a:buNone/>
+            </a:pPr>
+            <a:r>
+              <a:rPr lang="en-US" sz="1200" dirty="0">
+                <a:solidFill>
+                  <a:schemeClr val="accent6">
+                    <a:lumMod val="75000"/>
+                  </a:schemeClr>
+                </a:solidFill>
+              </a:rPr>
+              <a:t>					Reset instantaneous items back to 0</a:t>
+            </a:r>
+          </a:p>
+          <a:p>
+            <a:pPr marL="0" indent="0">
+              <a:buNone/>
+            </a:pPr>
+            <a:r>
+              <a:rPr lang="en-US" sz="1200" dirty="0"/>
+              <a:t>					Execute reaction to event </a:t>
             </a:r>
           </a:p>
           <a:p>
@@ -3486,57 +3674,18 @@
                   <a:schemeClr val="accent6"/>
                 </a:solidFill>
               </a:rPr>
-              <a:t>	Load Analysis level inputs (constants, structural statics)</a:t>
-            </a:r>
-          </a:p>
-          <a:p>
-            <a:pPr marL="0" indent="0">
-              <a:buNone/>
-            </a:pPr>
-            <a:r>
-              <a:rPr lang="en-US" sz="1200" b="1" dirty="0"/>
-              <a:t>	2- For replication in </a:t>
-            </a:r>
-            <a:r>
-              <a:rPr lang="en-US" sz="1200" b="1" dirty="0" err="1"/>
-              <a:t>n_replication</a:t>
-            </a:r>
-            <a:r>
-              <a:rPr lang="en-US" sz="1200" b="1" dirty="0"/>
-              <a:t> </a:t>
-            </a:r>
-            <a:r>
-              <a:rPr lang="en-US" sz="1200" dirty="0"/>
-              <a:t>(e.g., PSA)</a:t>
-            </a:r>
-            <a:endParaRPr lang="en-US" sz="1200" b="1" dirty="0"/>
-          </a:p>
-          <a:p>
-            <a:pPr marL="0" indent="0">
-              <a:buNone/>
-            </a:pPr>
+              <a:t>						</a:t>
+            </a:r>
             <a:r>
               <a:rPr lang="en-US" sz="1200" dirty="0">
                 <a:solidFill>
-                  <a:schemeClr val="accent6"/>
+                  <a:schemeClr val="accent6">
+                    <a:lumMod val="75000"/>
+                  </a:schemeClr>
                 </a:solidFill>
               </a:rPr>
-              <a:t>		Load Simulation level inputs (other statics)</a:t>
-            </a:r>
-          </a:p>
-          <a:p>
-            <a:pPr marL="0" indent="0">
-              <a:buNone/>
-            </a:pPr>
-            <a:r>
-              <a:rPr lang="en-US" sz="1200" b="1" dirty="0"/>
-              <a:t>		3- For patient in </a:t>
-            </a:r>
-            <a:r>
-              <a:rPr lang="en-US" sz="1200" b="1" dirty="0" err="1"/>
-              <a:t>n_patients</a:t>
-            </a:r>
-            <a:endParaRPr lang="en-US" sz="1200" b="1" dirty="0"/>
+              <a:t>Create/modify/remove inputs</a:t>
+            </a:r>
           </a:p>
           <a:p>
             <a:pPr marL="0" indent="0">
@@ -3545,117 +3694,9 @@
             <a:r>
               <a:rPr lang="en-US" sz="1200" dirty="0">
                 <a:solidFill>
-                  <a:schemeClr val="accent6"/>
-                </a:solidFill>
-              </a:rPr>
-              <a:t>			Load Patient level inputs (profiles)</a:t>
-            </a:r>
-          </a:p>
-          <a:p>
-            <a:pPr marL="0" indent="0">
-              <a:buNone/>
-            </a:pPr>
-            <a:r>
-              <a:rPr lang="en-US" sz="1200" b="1" dirty="0"/>
-              <a:t>			4- For intervention in </a:t>
-            </a:r>
-            <a:r>
-              <a:rPr lang="en-US" sz="1200" b="1" dirty="0" err="1"/>
-              <a:t>n_intervention</a:t>
-            </a:r>
-            <a:endParaRPr lang="en-US" sz="1200" b="1" dirty="0"/>
-          </a:p>
-          <a:p>
-            <a:pPr marL="0" indent="0">
-              <a:buNone/>
-            </a:pPr>
-            <a:r>
-              <a:rPr lang="en-US" sz="1200" dirty="0">
-                <a:solidFill>
-                  <a:schemeClr val="accent6"/>
-                </a:solidFill>
-              </a:rPr>
-              <a:t>				Load Intervention level inputs (Intervention Data, dynamic conditions)</a:t>
-            </a:r>
-          </a:p>
-          <a:p>
-            <a:pPr marL="0" indent="0">
-              <a:buNone/>
-            </a:pPr>
-            <a:r>
-              <a:rPr lang="en-US" sz="1200" dirty="0"/>
-              <a:t>				Set time = 0</a:t>
-            </a:r>
-          </a:p>
-          <a:p>
-            <a:pPr marL="0" indent="0">
-              <a:buNone/>
-            </a:pPr>
-            <a:r>
-              <a:rPr lang="en-US" sz="1200" dirty="0"/>
-              <a:t>				Initialize event times (by default set to Infinity)</a:t>
-            </a:r>
-          </a:p>
-          <a:p>
-            <a:pPr marL="0" indent="0">
-              <a:buNone/>
-            </a:pPr>
-            <a:r>
-              <a:rPr lang="en-US" sz="1200" b="1" dirty="0"/>
-              <a:t>				5- For event in </a:t>
-            </a:r>
-            <a:r>
-              <a:rPr lang="en-US" sz="1200" b="1" dirty="0" err="1"/>
-              <a:t>list_events</a:t>
-            </a:r>
-            <a:r>
-              <a:rPr lang="en-US" sz="1200" b="1" dirty="0"/>
-              <a:t> (sorted by time)</a:t>
-            </a:r>
-          </a:p>
-          <a:p>
-            <a:pPr marL="0" indent="0">
-              <a:buNone/>
-            </a:pPr>
-            <a:r>
-              <a:rPr lang="en-US" sz="1200" dirty="0">
-                <a:solidFill>
-                  <a:schemeClr val="accent6"/>
-                </a:solidFill>
-              </a:rPr>
-              <a:t>					Reset instantaneous items back to 0</a:t>
-            </a:r>
-          </a:p>
-          <a:p>
-            <a:pPr marL="0" indent="0">
-              <a:buNone/>
-            </a:pPr>
-            <a:r>
-              <a:rPr lang="en-US" sz="1200" dirty="0"/>
-              <a:t>					Execute reaction to event </a:t>
-            </a:r>
-          </a:p>
-          <a:p>
-            <a:pPr marL="0" indent="0">
-              <a:buNone/>
-            </a:pPr>
-            <a:r>
-              <a:rPr lang="en-US" sz="1200" dirty="0">
-                <a:solidFill>
-                  <a:schemeClr val="accent6"/>
-                </a:solidFill>
-              </a:rPr>
-              <a:t>						Create/modify/remove inputs</a:t>
-            </a:r>
-          </a:p>
-          <a:p>
-            <a:pPr marL="0" indent="0">
-              <a:buNone/>
-            </a:pPr>
-            <a:r>
-              <a:rPr lang="en-US" sz="1200" dirty="0">
-                <a:solidFill>
-                  <a:schemeClr val="accent6"/>
+                  <a:schemeClr val="accent6">
+                    <a:lumMod val="75000"/>
+                  </a:schemeClr>
                 </a:solidFill>
               </a:rPr>
               <a:t>							If ongoing variable, add a flag which determines that it was called here</a:t>
@@ -3668,7 +3709,9 @@
             <a:r>
               <a:rPr lang="en-US" sz="1200" dirty="0">
                 <a:solidFill>
-                  <a:schemeClr val="accent6"/>
+                  <a:schemeClr val="accent6">
+                    <a:lumMod val="75000"/>
+                  </a:schemeClr>
                 </a:solidFill>
               </a:rPr>
               <a:t>						Create/modify/remove events</a:t>
@@ -3697,7 +3740,7 @@
             </a:r>
             <a:r>
               <a:rPr lang="en-US" sz="1200" dirty="0"/>
-              <a:t> (vectorized) [ongoing (if ongoing, it uses the flags declared in </a:t>
+              <a:t> (vectorized) [ongoing (if ongoing, it uses the flags implicitly declared in </a:t>
             </a:r>
             <a:r>
               <a:rPr lang="en-US" sz="1200" dirty="0" err="1"/>
@@ -3705,7 +3748,7 @@
             </a:r>
             <a:r>
               <a:rPr lang="en-US" sz="1200" dirty="0"/>
-              <a:t>), instant, or per cycle] </a:t>
+              <a:t>), instant, or per cycle], frequency based outputs (if selected)</a:t>
             </a:r>
           </a:p>
           <a:p>
@@ -3714,14 +3757,8 @@
             </a:pPr>
             <a:r>
               <a:rPr lang="en-US" sz="1200" dirty="0"/>
-              <a:t>Return nested list of outcomes (e.g., results[analysis 1][simulation 1])</a:t>
-            </a:r>
-          </a:p>
-          <a:p>
-            <a:pPr marL="0" indent="0">
-              <a:buNone/>
-            </a:pPr>
-            <a:endParaRPr lang="en-US" sz="1200" dirty="0"/>
+              <a:t>Return nested list of outcomes (e.g., results[analysis 1][simulation 1]) at desired level of aggregation (full IPD, partially aggregated, fully aggregated)</a:t>
+            </a:r>
           </a:p>
         </p:txBody>
       </p:sp>

</xml_diff>